<commit_message>
Updated slide 12 of 'Continue' slideshow
</commit_message>
<xml_diff>
--- a/resources/ppt-slides/control-flow-continue-statement.pptx
+++ b/resources/ppt-slides/control-flow-continue-statement.pptx
@@ -258,7 +258,7 @@
           <a:p>
             <a:fld id="{964302DC-9F53-934F-AE4D-0F1F197008C1}" type="datetimeFigureOut">
               <a:rPr lang="en-US" smtClean="0"/>
-              <a:t>10/26/23</a:t>
+              <a:t>12/7/23</a:t>
             </a:fld>
             <a:endParaRPr lang="en-US"/>
           </a:p>
@@ -428,7 +428,7 @@
           <a:p>
             <a:fld id="{964302DC-9F53-934F-AE4D-0F1F197008C1}" type="datetimeFigureOut">
               <a:rPr lang="en-US" smtClean="0"/>
-              <a:t>10/26/23</a:t>
+              <a:t>12/7/23</a:t>
             </a:fld>
             <a:endParaRPr lang="en-US"/>
           </a:p>
@@ -608,7 +608,7 @@
           <a:p>
             <a:fld id="{964302DC-9F53-934F-AE4D-0F1F197008C1}" type="datetimeFigureOut">
               <a:rPr lang="en-US" smtClean="0"/>
-              <a:t>10/26/23</a:t>
+              <a:t>12/7/23</a:t>
             </a:fld>
             <a:endParaRPr lang="en-US"/>
           </a:p>
@@ -778,7 +778,7 @@
           <a:p>
             <a:fld id="{964302DC-9F53-934F-AE4D-0F1F197008C1}" type="datetimeFigureOut">
               <a:rPr lang="en-US" smtClean="0"/>
-              <a:t>10/26/23</a:t>
+              <a:t>12/7/23</a:t>
             </a:fld>
             <a:endParaRPr lang="en-US"/>
           </a:p>
@@ -1022,7 +1022,7 @@
           <a:p>
             <a:fld id="{964302DC-9F53-934F-AE4D-0F1F197008C1}" type="datetimeFigureOut">
               <a:rPr lang="en-US" smtClean="0"/>
-              <a:t>10/26/23</a:t>
+              <a:t>12/7/23</a:t>
             </a:fld>
             <a:endParaRPr lang="en-US"/>
           </a:p>
@@ -1254,7 +1254,7 @@
           <a:p>
             <a:fld id="{964302DC-9F53-934F-AE4D-0F1F197008C1}" type="datetimeFigureOut">
               <a:rPr lang="en-US" smtClean="0"/>
-              <a:t>10/26/23</a:t>
+              <a:t>12/7/23</a:t>
             </a:fld>
             <a:endParaRPr lang="en-US"/>
           </a:p>
@@ -1621,7 +1621,7 @@
           <a:p>
             <a:fld id="{964302DC-9F53-934F-AE4D-0F1F197008C1}" type="datetimeFigureOut">
               <a:rPr lang="en-US" smtClean="0"/>
-              <a:t>10/26/23</a:t>
+              <a:t>12/7/23</a:t>
             </a:fld>
             <a:endParaRPr lang="en-US"/>
           </a:p>
@@ -1739,7 +1739,7 @@
           <a:p>
             <a:fld id="{964302DC-9F53-934F-AE4D-0F1F197008C1}" type="datetimeFigureOut">
               <a:rPr lang="en-US" smtClean="0"/>
-              <a:t>10/26/23</a:t>
+              <a:t>12/7/23</a:t>
             </a:fld>
             <a:endParaRPr lang="en-US"/>
           </a:p>
@@ -1834,7 +1834,7 @@
           <a:p>
             <a:fld id="{964302DC-9F53-934F-AE4D-0F1F197008C1}" type="datetimeFigureOut">
               <a:rPr lang="en-US" smtClean="0"/>
-              <a:t>10/26/23</a:t>
+              <a:t>12/7/23</a:t>
             </a:fld>
             <a:endParaRPr lang="en-US"/>
           </a:p>
@@ -2111,7 +2111,7 @@
           <a:p>
             <a:fld id="{964302DC-9F53-934F-AE4D-0F1F197008C1}" type="datetimeFigureOut">
               <a:rPr lang="en-US" smtClean="0"/>
-              <a:t>10/26/23</a:t>
+              <a:t>12/7/23</a:t>
             </a:fld>
             <a:endParaRPr lang="en-US"/>
           </a:p>
@@ -2368,7 +2368,7 @@
           <a:p>
             <a:fld id="{964302DC-9F53-934F-AE4D-0F1F197008C1}" type="datetimeFigureOut">
               <a:rPr lang="en-US" smtClean="0"/>
-              <a:t>10/26/23</a:t>
+              <a:t>12/7/23</a:t>
             </a:fld>
             <a:endParaRPr lang="en-US"/>
           </a:p>
@@ -2581,7 +2581,7 @@
           <a:p>
             <a:fld id="{964302DC-9F53-934F-AE4D-0F1F197008C1}" type="datetimeFigureOut">
               <a:rPr lang="en-US" smtClean="0"/>
-              <a:t>10/26/23</a:t>
+              <a:t>12/7/23</a:t>
             </a:fld>
             <a:endParaRPr lang="en-US"/>
           </a:p>
@@ -5369,23 +5369,23 @@
           <a:custGeom>
             <a:avLst/>
             <a:gdLst>
-              <a:gd name="connsiteX0" fmla="*/ 0 w 1687408"/>
+              <a:gd name="connsiteX0" fmla="*/ 0 w 1450791"/>
               <a:gd name="connsiteY0" fmla="*/ 0 h 307777"/>
-              <a:gd name="connsiteX1" fmla="*/ 545595 w 1687408"/>
+              <a:gd name="connsiteX1" fmla="*/ 469089 w 1450791"/>
               <a:gd name="connsiteY1" fmla="*/ 0 h 307777"/>
-              <a:gd name="connsiteX2" fmla="*/ 1057442 w 1687408"/>
+              <a:gd name="connsiteX2" fmla="*/ 909162 w 1450791"/>
               <a:gd name="connsiteY2" fmla="*/ 0 h 307777"/>
-              <a:gd name="connsiteX3" fmla="*/ 1687408 w 1687408"/>
+              <a:gd name="connsiteX3" fmla="*/ 1450791 w 1450791"/>
               <a:gd name="connsiteY3" fmla="*/ 0 h 307777"/>
-              <a:gd name="connsiteX4" fmla="*/ 1687408 w 1687408"/>
+              <a:gd name="connsiteX4" fmla="*/ 1450791 w 1450791"/>
               <a:gd name="connsiteY4" fmla="*/ 307777 h 307777"/>
-              <a:gd name="connsiteX5" fmla="*/ 1158687 w 1687408"/>
+              <a:gd name="connsiteX5" fmla="*/ 996210 w 1450791"/>
               <a:gd name="connsiteY5" fmla="*/ 307777 h 307777"/>
-              <a:gd name="connsiteX6" fmla="*/ 562469 w 1687408"/>
+              <a:gd name="connsiteX6" fmla="*/ 483597 w 1450791"/>
               <a:gd name="connsiteY6" fmla="*/ 307777 h 307777"/>
-              <a:gd name="connsiteX7" fmla="*/ 0 w 1687408"/>
+              <a:gd name="connsiteX7" fmla="*/ 0 w 1450791"/>
               <a:gd name="connsiteY7" fmla="*/ 307777 h 307777"/>
-              <a:gd name="connsiteX8" fmla="*/ 0 w 1687408"/>
+              <a:gd name="connsiteX8" fmla="*/ 0 w 1450791"/>
               <a:gd name="connsiteY8" fmla="*/ 0 h 307777"/>
             </a:gdLst>
             <a:ahLst/>
@@ -5420,43 +5420,43 @@
             </a:cxnLst>
             <a:rect l="l" t="t" r="r" b="b"/>
             <a:pathLst>
-              <a:path w="1687408" h="307777" extrusionOk="0">
+              <a:path w="1450791" h="307777" extrusionOk="0">
                 <a:moveTo>
                   <a:pt x="0" y="0"/>
                 </a:moveTo>
                 <a:cubicBezTo>
-                  <a:pt x="128936" y="6660"/>
-                  <a:pt x="319593" y="-22133"/>
-                  <a:pt x="545595" y="0"/>
+                  <a:pt x="150675" y="-4249"/>
+                  <a:pt x="352734" y="-14730"/>
+                  <a:pt x="469089" y="0"/>
                 </a:cubicBezTo>
                 <a:cubicBezTo>
-                  <a:pt x="771597" y="22133"/>
-                  <a:pt x="809002" y="-23071"/>
-                  <a:pt x="1057442" y="0"/>
+                  <a:pt x="585444" y="14730"/>
+                  <a:pt x="789481" y="20990"/>
+                  <a:pt x="909162" y="0"/>
                 </a:cubicBezTo>
                 <a:cubicBezTo>
-                  <a:pt x="1305882" y="23071"/>
-                  <a:pt x="1451336" y="-20848"/>
-                  <a:pt x="1687408" y="0"/>
+                  <a:pt x="1028843" y="-20990"/>
+                  <a:pt x="1242402" y="2768"/>
+                  <a:pt x="1450791" y="0"/>
                 </a:cubicBezTo>
                 <a:cubicBezTo>
-                  <a:pt x="1692846" y="133970"/>
-                  <a:pt x="1683251" y="197125"/>
-                  <a:pt x="1687408" y="307777"/>
+                  <a:pt x="1456229" y="133970"/>
+                  <a:pt x="1446634" y="197125"/>
+                  <a:pt x="1450791" y="307777"/>
                 </a:cubicBezTo>
                 <a:cubicBezTo>
-                  <a:pt x="1482592" y="292155"/>
-                  <a:pt x="1308745" y="293224"/>
-                  <a:pt x="1158687" y="307777"/>
+                  <a:pt x="1333195" y="294757"/>
+                  <a:pt x="1100499" y="330196"/>
+                  <a:pt x="996210" y="307777"/>
                 </a:cubicBezTo>
                 <a:cubicBezTo>
-                  <a:pt x="1008629" y="322330"/>
-                  <a:pt x="799311" y="298125"/>
-                  <a:pt x="562469" y="307777"/>
+                  <a:pt x="891921" y="285358"/>
+                  <a:pt x="589493" y="289357"/>
+                  <a:pt x="483597" y="307777"/>
                 </a:cubicBezTo>
                 <a:cubicBezTo>
-                  <a:pt x="325627" y="317429"/>
-                  <a:pt x="126178" y="279914"/>
+                  <a:pt x="377701" y="326197"/>
+                  <a:pt x="104073" y="295228"/>
                   <a:pt x="0" y="307777"/>
                 </a:cubicBezTo>
                 <a:cubicBezTo>
@@ -13861,7 +13861,7 @@
           <p:spPr>
             <a:xfrm>
               <a:off x="2492465" y="375300"/>
-              <a:ext cx="832115" cy="646331"/>
+              <a:ext cx="832115" cy="369332"/>
             </a:xfrm>
             <a:prstGeom prst="rect">
               <a:avLst/>
@@ -13873,12 +13873,6 @@
               <a:spAutoFit/>
             </a:bodyPr>
             <a:lstStyle/>
-            <a:p>
-              <a:r>
-                <a:rPr lang="en-US" dirty="0"/>
-                <a:t>6,</a:t>
-              </a:r>
-            </a:p>
             <a:p>
               <a:r>
                 <a:rPr lang="en-US" dirty="0"/>

</xml_diff>

<commit_message>
Edit P1C3 continue concept.
</commit_message>
<xml_diff>
--- a/resources/ppt-slides/control-flow-continue-statement.pptx
+++ b/resources/ppt-slides/control-flow-continue-statement.pptx
@@ -258,7 +258,7 @@
           <a:p>
             <a:fld id="{964302DC-9F53-934F-AE4D-0F1F197008C1}" type="datetimeFigureOut">
               <a:rPr lang="en-US" smtClean="0"/>
-              <a:t>12/7/23</a:t>
+              <a:t>2/12/24</a:t>
             </a:fld>
             <a:endParaRPr lang="en-US"/>
           </a:p>
@@ -428,7 +428,7 @@
           <a:p>
             <a:fld id="{964302DC-9F53-934F-AE4D-0F1F197008C1}" type="datetimeFigureOut">
               <a:rPr lang="en-US" smtClean="0"/>
-              <a:t>12/7/23</a:t>
+              <a:t>2/12/24</a:t>
             </a:fld>
             <a:endParaRPr lang="en-US"/>
           </a:p>
@@ -608,7 +608,7 @@
           <a:p>
             <a:fld id="{964302DC-9F53-934F-AE4D-0F1F197008C1}" type="datetimeFigureOut">
               <a:rPr lang="en-US" smtClean="0"/>
-              <a:t>12/7/23</a:t>
+              <a:t>2/12/24</a:t>
             </a:fld>
             <a:endParaRPr lang="en-US"/>
           </a:p>
@@ -778,7 +778,7 @@
           <a:p>
             <a:fld id="{964302DC-9F53-934F-AE4D-0F1F197008C1}" type="datetimeFigureOut">
               <a:rPr lang="en-US" smtClean="0"/>
-              <a:t>12/7/23</a:t>
+              <a:t>2/12/24</a:t>
             </a:fld>
             <a:endParaRPr lang="en-US"/>
           </a:p>
@@ -1022,7 +1022,7 @@
           <a:p>
             <a:fld id="{964302DC-9F53-934F-AE4D-0F1F197008C1}" type="datetimeFigureOut">
               <a:rPr lang="en-US" smtClean="0"/>
-              <a:t>12/7/23</a:t>
+              <a:t>2/12/24</a:t>
             </a:fld>
             <a:endParaRPr lang="en-US"/>
           </a:p>
@@ -1254,7 +1254,7 @@
           <a:p>
             <a:fld id="{964302DC-9F53-934F-AE4D-0F1F197008C1}" type="datetimeFigureOut">
               <a:rPr lang="en-US" smtClean="0"/>
-              <a:t>12/7/23</a:t>
+              <a:t>2/12/24</a:t>
             </a:fld>
             <a:endParaRPr lang="en-US"/>
           </a:p>
@@ -1621,7 +1621,7 @@
           <a:p>
             <a:fld id="{964302DC-9F53-934F-AE4D-0F1F197008C1}" type="datetimeFigureOut">
               <a:rPr lang="en-US" smtClean="0"/>
-              <a:t>12/7/23</a:t>
+              <a:t>2/12/24</a:t>
             </a:fld>
             <a:endParaRPr lang="en-US"/>
           </a:p>
@@ -1739,7 +1739,7 @@
           <a:p>
             <a:fld id="{964302DC-9F53-934F-AE4D-0F1F197008C1}" type="datetimeFigureOut">
               <a:rPr lang="en-US" smtClean="0"/>
-              <a:t>12/7/23</a:t>
+              <a:t>2/12/24</a:t>
             </a:fld>
             <a:endParaRPr lang="en-US"/>
           </a:p>
@@ -1834,7 +1834,7 @@
           <a:p>
             <a:fld id="{964302DC-9F53-934F-AE4D-0F1F197008C1}" type="datetimeFigureOut">
               <a:rPr lang="en-US" smtClean="0"/>
-              <a:t>12/7/23</a:t>
+              <a:t>2/12/24</a:t>
             </a:fld>
             <a:endParaRPr lang="en-US"/>
           </a:p>
@@ -2111,7 +2111,7 @@
           <a:p>
             <a:fld id="{964302DC-9F53-934F-AE4D-0F1F197008C1}" type="datetimeFigureOut">
               <a:rPr lang="en-US" smtClean="0"/>
-              <a:t>12/7/23</a:t>
+              <a:t>2/12/24</a:t>
             </a:fld>
             <a:endParaRPr lang="en-US"/>
           </a:p>
@@ -2368,7 +2368,7 @@
           <a:p>
             <a:fld id="{964302DC-9F53-934F-AE4D-0F1F197008C1}" type="datetimeFigureOut">
               <a:rPr lang="en-US" smtClean="0"/>
-              <a:t>12/7/23</a:t>
+              <a:t>2/12/24</a:t>
             </a:fld>
             <a:endParaRPr lang="en-US"/>
           </a:p>
@@ -2433,9 +2433,18 @@
 <p:sldMaster xmlns:a="http://schemas.openxmlformats.org/drawingml/2006/main" xmlns:r="http://schemas.openxmlformats.org/officeDocument/2006/relationships" xmlns:p="http://schemas.openxmlformats.org/presentationml/2006/main">
   <p:cSld>
     <p:bg>
-      <p:bgRef idx="1001">
-        <a:schemeClr val="bg1"/>
-      </p:bgRef>
+      <p:bgPr>
+        <a:blipFill dpi="0" rotWithShape="1">
+          <a:blip r:embed="rId13">
+            <a:lum/>
+          </a:blip>
+          <a:srcRect/>
+          <a:stretch>
+            <a:fillRect/>
+          </a:stretch>
+        </a:blipFill>
+        <a:effectLst/>
+      </p:bgPr>
     </p:bg>
     <p:spTree>
       <p:nvGrpSpPr>
@@ -2581,7 +2590,7 @@
           <a:p>
             <a:fld id="{964302DC-9F53-934F-AE4D-0F1F197008C1}" type="datetimeFigureOut">
               <a:rPr lang="en-US" smtClean="0"/>
-              <a:t>12/7/23</a:t>
+              <a:t>2/12/24</a:t>
             </a:fld>
             <a:endParaRPr lang="en-US"/>
           </a:p>
@@ -2972,20 +2981,6 @@
 <file path=ppt/slides/slide1.xml><?xml version="1.0" encoding="utf-8"?>
 <p:sld xmlns:a="http://schemas.openxmlformats.org/drawingml/2006/main" xmlns:r="http://schemas.openxmlformats.org/officeDocument/2006/relationships" xmlns:p="http://schemas.openxmlformats.org/presentationml/2006/main">
   <p:cSld>
-    <p:bg>
-      <p:bgPr>
-        <a:blipFill dpi="0" rotWithShape="1">
-          <a:blip r:embed="rId2">
-            <a:lum/>
-          </a:blip>
-          <a:srcRect/>
-          <a:stretch>
-            <a:fillRect/>
-          </a:stretch>
-        </a:blipFill>
-        <a:effectLst/>
-      </p:bgPr>
-    </p:bg>
     <p:spTree>
       <p:nvGrpSpPr>
         <p:cNvPr id="1" name=""/>
@@ -3034,7 +3029,7 @@
           </p:nvSpPr>
           <p:spPr>
             <a:xfrm>
-              <a:off x="2236424" y="-2299353"/>
+              <a:off x="2264417" y="-2299353"/>
               <a:ext cx="5046276" cy="2062103"/>
             </a:xfrm>
             <a:prstGeom prst="rect">
@@ -3054,7 +3049,7 @@
               </a:pPr>
               <a:r>
                 <a:rPr lang="en-AU" sz="1600" dirty="0"/>
-                <a:t>for(</a:t>
+                <a:t>for (</a:t>
               </a:r>
               <a:r>
                 <a:rPr lang="en-AU" sz="1600" dirty="0">
@@ -3154,7 +3149,7 @@
                     </a:schemeClr>
                   </a:solidFill>
                 </a:rPr>
-                <a:t>    if ( </a:t>
+                <a:t>    if (</a:t>
               </a:r>
               <a:r>
                 <a:rPr lang="en-AU" sz="1600" dirty="0" err="1">
@@ -3194,7 +3189,7 @@
                     </a:schemeClr>
                   </a:solidFill>
                 </a:rPr>
-                <a:t> % 3 == 0 )</a:t>
+                <a:t> % 3 == 0)</a:t>
               </a:r>
             </a:p>
             <a:p>
@@ -3334,7 +3329,7 @@
               <p:nvPr/>
             </p:nvPicPr>
             <p:blipFill>
-              <a:blip r:embed="rId3">
+              <a:blip r:embed="rId2">
                 <a:alphaModFix amt="30000"/>
               </a:blip>
               <a:stretch>
@@ -5139,7 +5134,7 @@
             <p:nvPr/>
           </p:nvPicPr>
           <p:blipFill>
-            <a:blip r:embed="rId4">
+            <a:blip r:embed="rId3">
               <a:alphaModFix amt="30000"/>
             </a:blip>
             <a:stretch>
@@ -5758,20 +5753,6 @@
 <file path=ppt/slides/slide10.xml><?xml version="1.0" encoding="utf-8"?>
 <p:sld xmlns:a="http://schemas.openxmlformats.org/drawingml/2006/main" xmlns:r="http://schemas.openxmlformats.org/officeDocument/2006/relationships" xmlns:p="http://schemas.openxmlformats.org/presentationml/2006/main">
   <p:cSld>
-    <p:bg>
-      <p:bgPr>
-        <a:blipFill dpi="0" rotWithShape="1">
-          <a:blip r:embed="rId2">
-            <a:lum/>
-          </a:blip>
-          <a:srcRect/>
-          <a:stretch>
-            <a:fillRect/>
-          </a:stretch>
-        </a:blipFill>
-        <a:effectLst/>
-      </p:bgPr>
-    </p:bg>
     <p:spTree>
       <p:nvGrpSpPr>
         <p:cNvPr id="1" name=""/>
@@ -5820,7 +5801,7 @@
           </p:nvSpPr>
           <p:spPr>
             <a:xfrm>
-              <a:off x="2236424" y="-2299353"/>
+              <a:off x="2264417" y="-2299353"/>
               <a:ext cx="5046276" cy="2062103"/>
             </a:xfrm>
             <a:prstGeom prst="rect">
@@ -5840,7 +5821,7 @@
               </a:pPr>
               <a:r>
                 <a:rPr lang="en-AU" sz="1600" dirty="0"/>
-                <a:t>for(</a:t>
+                <a:t>for (</a:t>
               </a:r>
               <a:r>
                 <a:rPr lang="en-AU" sz="1600" dirty="0">
@@ -5938,7 +5919,7 @@
                     </a:schemeClr>
                   </a:solidFill>
                 </a:rPr>
-                <a:t>    if ( </a:t>
+                <a:t>    if (</a:t>
               </a:r>
               <a:r>
                 <a:rPr lang="en-AU" sz="1600" dirty="0" err="1">
@@ -5978,7 +5959,7 @@
                     </a:schemeClr>
                   </a:solidFill>
                 </a:rPr>
-                <a:t> % 3 == 0 )</a:t>
+                <a:t> % 3 == 0)</a:t>
               </a:r>
             </a:p>
             <a:p>
@@ -6118,7 +6099,7 @@
               <p:nvPr/>
             </p:nvPicPr>
             <p:blipFill>
-              <a:blip r:embed="rId3">
+              <a:blip r:embed="rId2">
                 <a:alphaModFix amt="30000"/>
               </a:blip>
               <a:stretch>
@@ -7923,7 +7904,7 @@
             <p:nvPr/>
           </p:nvPicPr>
           <p:blipFill>
-            <a:blip r:embed="rId4">
+            <a:blip r:embed="rId3">
               <a:alphaModFix amt="30000"/>
             </a:blip>
             <a:stretch>
@@ -8680,20 +8661,6 @@
 <file path=ppt/slides/slide11.xml><?xml version="1.0" encoding="utf-8"?>
 <p:sld xmlns:a="http://schemas.openxmlformats.org/drawingml/2006/main" xmlns:r="http://schemas.openxmlformats.org/officeDocument/2006/relationships" xmlns:p="http://schemas.openxmlformats.org/presentationml/2006/main">
   <p:cSld>
-    <p:bg>
-      <p:bgPr>
-        <a:blipFill dpi="0" rotWithShape="1">
-          <a:blip r:embed="rId2">
-            <a:lum/>
-          </a:blip>
-          <a:srcRect/>
-          <a:stretch>
-            <a:fillRect/>
-          </a:stretch>
-        </a:blipFill>
-        <a:effectLst/>
-      </p:bgPr>
-    </p:bg>
     <p:spTree>
       <p:nvGrpSpPr>
         <p:cNvPr id="1" name=""/>
@@ -8768,7 +8735,7 @@
                     </a:schemeClr>
                   </a:solidFill>
                 </a:rPr>
-                <a:t>for(int </a:t>
+                <a:t>for (int </a:t>
               </a:r>
               <a:r>
                 <a:rPr lang="en-AU" sz="1600" dirty="0" err="1">
@@ -8854,7 +8821,7 @@
               </a:pPr>
               <a:r>
                 <a:rPr lang="en-AU" sz="1600" dirty="0"/>
-                <a:t>    if ( </a:t>
+                <a:t>    if (</a:t>
               </a:r>
               <a:r>
                 <a:rPr lang="en-AU" sz="1600" dirty="0" err="1">
@@ -8890,7 +8857,7 @@
                     <a:srgbClr val="0070C0"/>
                   </a:solidFill>
                 </a:rPr>
-                <a:t> % 3 == 0 </a:t>
+                <a:t> % 3 == 0</a:t>
               </a:r>
               <a:r>
                 <a:rPr lang="en-AU" sz="1600" dirty="0"/>
@@ -9034,7 +9001,7 @@
               <p:nvPr/>
             </p:nvPicPr>
             <p:blipFill>
-              <a:blip r:embed="rId3">
+              <a:blip r:embed="rId2">
                 <a:alphaModFix amt="30000"/>
               </a:blip>
               <a:stretch>
@@ -10839,7 +10806,7 @@
             <p:nvPr/>
           </p:nvPicPr>
           <p:blipFill>
-            <a:blip r:embed="rId4">
+            <a:blip r:embed="rId3">
               <a:alphaModFix amt="30000"/>
             </a:blip>
             <a:stretch>
@@ -11737,20 +11704,6 @@
 <file path=ppt/slides/slide12.xml><?xml version="1.0" encoding="utf-8"?>
 <p:sld xmlns:a="http://schemas.openxmlformats.org/drawingml/2006/main" xmlns:r="http://schemas.openxmlformats.org/officeDocument/2006/relationships" xmlns:p="http://schemas.openxmlformats.org/presentationml/2006/main">
   <p:cSld>
-    <p:bg>
-      <p:bgPr>
-        <a:blipFill dpi="0" rotWithShape="1">
-          <a:blip r:embed="rId2">
-            <a:lum/>
-          </a:blip>
-          <a:srcRect/>
-          <a:stretch>
-            <a:fillRect/>
-          </a:stretch>
-        </a:blipFill>
-        <a:effectLst/>
-      </p:bgPr>
-    </p:bg>
     <p:spTree>
       <p:nvGrpSpPr>
         <p:cNvPr id="1" name=""/>
@@ -11825,7 +11778,7 @@
                     </a:schemeClr>
                   </a:solidFill>
                 </a:rPr>
-                <a:t>for(int </a:t>
+                <a:t>for (int </a:t>
               </a:r>
               <a:r>
                 <a:rPr lang="en-AU" sz="1600" dirty="0" err="1">
@@ -11917,7 +11870,7 @@
                     </a:schemeClr>
                   </a:solidFill>
                 </a:rPr>
-                <a:t>    if ( </a:t>
+                <a:t>    if (</a:t>
               </a:r>
               <a:r>
                 <a:rPr lang="en-AU" sz="1600" dirty="0" err="1">
@@ -11957,7 +11910,7 @@
                     </a:schemeClr>
                   </a:solidFill>
                 </a:rPr>
-                <a:t> % 3 == 0 )</a:t>
+                <a:t> % 3 == 0)</a:t>
               </a:r>
             </a:p>
             <a:p>
@@ -12091,7 +12044,7 @@
               <p:nvPr/>
             </p:nvPicPr>
             <p:blipFill>
-              <a:blip r:embed="rId3">
+              <a:blip r:embed="rId2">
                 <a:alphaModFix amt="30000"/>
               </a:blip>
               <a:stretch>
@@ -13896,7 +13849,7 @@
             <p:nvPr/>
           </p:nvPicPr>
           <p:blipFill>
-            <a:blip r:embed="rId4">
+            <a:blip r:embed="rId3">
               <a:alphaModFix amt="30000"/>
             </a:blip>
             <a:stretch>
@@ -14682,20 +14635,6 @@
 <file path=ppt/slides/slide13.xml><?xml version="1.0" encoding="utf-8"?>
 <p:sld xmlns:a="http://schemas.openxmlformats.org/drawingml/2006/main" xmlns:r="http://schemas.openxmlformats.org/officeDocument/2006/relationships" xmlns:p="http://schemas.openxmlformats.org/presentationml/2006/main">
   <p:cSld>
-    <p:bg>
-      <p:bgPr>
-        <a:blipFill dpi="0" rotWithShape="1">
-          <a:blip r:embed="rId2">
-            <a:lum/>
-          </a:blip>
-          <a:srcRect/>
-          <a:stretch>
-            <a:fillRect/>
-          </a:stretch>
-        </a:blipFill>
-        <a:effectLst/>
-      </p:bgPr>
-    </p:bg>
     <p:spTree>
       <p:nvGrpSpPr>
         <p:cNvPr id="1" name=""/>
@@ -14744,7 +14683,7 @@
           </p:nvSpPr>
           <p:spPr>
             <a:xfrm>
-              <a:off x="2236424" y="-2299353"/>
+              <a:off x="2264417" y="-2299353"/>
               <a:ext cx="5046276" cy="2062103"/>
             </a:xfrm>
             <a:prstGeom prst="rect">
@@ -14764,7 +14703,7 @@
               </a:pPr>
               <a:r>
                 <a:rPr lang="en-AU" sz="1600" dirty="0"/>
-                <a:t>for(</a:t>
+                <a:t>for (</a:t>
               </a:r>
               <a:r>
                 <a:rPr lang="en-AU" sz="1600" dirty="0">
@@ -14862,7 +14801,7 @@
                     </a:schemeClr>
                   </a:solidFill>
                 </a:rPr>
-                <a:t>    if ( </a:t>
+                <a:t>    if (</a:t>
               </a:r>
               <a:r>
                 <a:rPr lang="en-AU" sz="1600" dirty="0" err="1">
@@ -14902,7 +14841,7 @@
                     </a:schemeClr>
                   </a:solidFill>
                 </a:rPr>
-                <a:t> % 3 == 0 )</a:t>
+                <a:t> % 3 == 0)</a:t>
               </a:r>
             </a:p>
             <a:p>
@@ -15042,7 +14981,7 @@
               <p:nvPr/>
             </p:nvPicPr>
             <p:blipFill>
-              <a:blip r:embed="rId3">
+              <a:blip r:embed="rId2">
                 <a:alphaModFix amt="30000"/>
               </a:blip>
               <a:stretch>
@@ -16847,7 +16786,7 @@
             <p:nvPr/>
           </p:nvPicPr>
           <p:blipFill>
-            <a:blip r:embed="rId4">
+            <a:blip r:embed="rId3">
               <a:alphaModFix amt="30000"/>
             </a:blip>
             <a:stretch>
@@ -17605,20 +17544,6 @@
 <file path=ppt/slides/slide14.xml><?xml version="1.0" encoding="utf-8"?>
 <p:sld xmlns:a="http://schemas.openxmlformats.org/drawingml/2006/main" xmlns:r="http://schemas.openxmlformats.org/officeDocument/2006/relationships" xmlns:p="http://schemas.openxmlformats.org/presentationml/2006/main">
   <p:cSld>
-    <p:bg>
-      <p:bgPr>
-        <a:blipFill dpi="0" rotWithShape="1">
-          <a:blip r:embed="rId2">
-            <a:lum/>
-          </a:blip>
-          <a:srcRect/>
-          <a:stretch>
-            <a:fillRect/>
-          </a:stretch>
-        </a:blipFill>
-        <a:effectLst/>
-      </p:bgPr>
-    </p:bg>
     <p:spTree>
       <p:nvGrpSpPr>
         <p:cNvPr id="1" name=""/>
@@ -17693,7 +17618,7 @@
                     </a:schemeClr>
                   </a:solidFill>
                 </a:rPr>
-                <a:t>for(int </a:t>
+                <a:t>for (int </a:t>
               </a:r>
               <a:r>
                 <a:rPr lang="en-AU" sz="1600" dirty="0" err="1">
@@ -17779,7 +17704,7 @@
               </a:pPr>
               <a:r>
                 <a:rPr lang="en-AU" sz="1600" dirty="0"/>
-                <a:t>    if ( </a:t>
+                <a:t>    if (</a:t>
               </a:r>
               <a:r>
                 <a:rPr lang="en-AU" sz="1600" dirty="0" err="1"/>
@@ -17803,7 +17728,7 @@
                     <a:srgbClr val="BA38EF"/>
                   </a:solidFill>
                 </a:rPr>
-                <a:t> % 3 == 0 </a:t>
+                <a:t> % 3 == 0</a:t>
               </a:r>
               <a:r>
                 <a:rPr lang="en-AU" sz="1600" dirty="0"/>
@@ -17947,7 +17872,7 @@
               <p:nvPr/>
             </p:nvPicPr>
             <p:blipFill>
-              <a:blip r:embed="rId3">
+              <a:blip r:embed="rId2">
                 <a:alphaModFix amt="30000"/>
               </a:blip>
               <a:stretch>
@@ -19732,7 +19657,7 @@
             <a:p>
               <a:r>
                 <a:rPr lang="en-US" dirty="0"/>
-                <a:t>4,6,7</a:t>
+                <a:t>7</a:t>
               </a:r>
             </a:p>
           </p:txBody>
@@ -19752,7 +19677,7 @@
             <p:nvPr/>
           </p:nvPicPr>
           <p:blipFill>
-            <a:blip r:embed="rId4">
+            <a:blip r:embed="rId3">
               <a:alphaModFix amt="30000"/>
             </a:blip>
             <a:stretch>
@@ -20636,20 +20561,6 @@
 <file path=ppt/slides/slide15.xml><?xml version="1.0" encoding="utf-8"?>
 <p:sld xmlns:a="http://schemas.openxmlformats.org/drawingml/2006/main" xmlns:r="http://schemas.openxmlformats.org/officeDocument/2006/relationships" xmlns:p="http://schemas.openxmlformats.org/presentationml/2006/main">
   <p:cSld>
-    <p:bg>
-      <p:bgPr>
-        <a:blipFill dpi="0" rotWithShape="1">
-          <a:blip r:embed="rId2">
-            <a:lum/>
-          </a:blip>
-          <a:srcRect/>
-          <a:stretch>
-            <a:fillRect/>
-          </a:stretch>
-        </a:blipFill>
-        <a:effectLst/>
-      </p:bgPr>
-    </p:bg>
     <p:spTree>
       <p:nvGrpSpPr>
         <p:cNvPr id="1" name=""/>
@@ -20724,7 +20635,7 @@
                     </a:schemeClr>
                   </a:solidFill>
                 </a:rPr>
-                <a:t>for(int </a:t>
+                <a:t>for (int </a:t>
               </a:r>
               <a:r>
                 <a:rPr lang="en-AU" sz="1600" dirty="0" err="1">
@@ -20816,7 +20727,7 @@
                     </a:schemeClr>
                   </a:solidFill>
                 </a:rPr>
-                <a:t>    if ( </a:t>
+                <a:t>    if (</a:t>
               </a:r>
               <a:r>
                 <a:rPr lang="en-AU" sz="1600" dirty="0" err="1">
@@ -20856,7 +20767,7 @@
                     </a:schemeClr>
                   </a:solidFill>
                 </a:rPr>
-                <a:t> % 3 == 0 )</a:t>
+                <a:t> % 3 == 0)</a:t>
               </a:r>
             </a:p>
             <a:p>
@@ -20978,7 +20889,7 @@
               <p:nvPr/>
             </p:nvPicPr>
             <p:blipFill>
-              <a:blip r:embed="rId3">
+              <a:blip r:embed="rId2">
                 <a:alphaModFix amt="30000"/>
               </a:blip>
               <a:stretch>
@@ -22774,7 +22685,7 @@
             <p:nvPr/>
           </p:nvPicPr>
           <p:blipFill>
-            <a:blip r:embed="rId4">
+            <a:blip r:embed="rId3">
               <a:alphaModFix/>
             </a:blip>
             <a:stretch>
@@ -23534,20 +23445,6 @@
 <file path=ppt/slides/slide16.xml><?xml version="1.0" encoding="utf-8"?>
 <p:sld xmlns:a="http://schemas.openxmlformats.org/drawingml/2006/main" xmlns:r="http://schemas.openxmlformats.org/officeDocument/2006/relationships" xmlns:p="http://schemas.openxmlformats.org/presentationml/2006/main">
   <p:cSld>
-    <p:bg>
-      <p:bgPr>
-        <a:blipFill dpi="0" rotWithShape="1">
-          <a:blip r:embed="rId2">
-            <a:lum/>
-          </a:blip>
-          <a:srcRect/>
-          <a:stretch>
-            <a:fillRect/>
-          </a:stretch>
-        </a:blipFill>
-        <a:effectLst/>
-      </p:bgPr>
-    </p:bg>
     <p:spTree>
       <p:nvGrpSpPr>
         <p:cNvPr id="1" name=""/>
@@ -23596,7 +23493,7 @@
           </p:nvSpPr>
           <p:spPr>
             <a:xfrm>
-              <a:off x="2236424" y="-2299353"/>
+              <a:off x="2264417" y="-2299353"/>
               <a:ext cx="5046276" cy="2062103"/>
             </a:xfrm>
             <a:prstGeom prst="rect">
@@ -23616,7 +23513,7 @@
               </a:pPr>
               <a:r>
                 <a:rPr lang="en-AU" sz="1600" dirty="0"/>
-                <a:t>for(</a:t>
+                <a:t>for (</a:t>
               </a:r>
               <a:r>
                 <a:rPr lang="en-AU" sz="1600" dirty="0">
@@ -23722,7 +23619,7 @@
                     </a:schemeClr>
                   </a:solidFill>
                 </a:rPr>
-                <a:t>    if ( </a:t>
+                <a:t>    if (</a:t>
               </a:r>
               <a:r>
                 <a:rPr lang="en-AU" sz="1600" dirty="0" err="1">
@@ -23762,7 +23659,7 @@
                     </a:schemeClr>
                   </a:solidFill>
                 </a:rPr>
-                <a:t> % 3 == 0 )</a:t>
+                <a:t> % 3 == 0)</a:t>
               </a:r>
             </a:p>
             <a:p>
@@ -23902,7 +23799,7 @@
               <p:nvPr/>
             </p:nvPicPr>
             <p:blipFill>
-              <a:blip r:embed="rId3">
+              <a:blip r:embed="rId2">
                 <a:alphaModFix amt="30000"/>
               </a:blip>
               <a:stretch>
@@ -25707,7 +25604,7 @@
             <p:nvPr/>
           </p:nvPicPr>
           <p:blipFill>
-            <a:blip r:embed="rId4">
+            <a:blip r:embed="rId3">
               <a:alphaModFix amt="30000"/>
             </a:blip>
             <a:stretch>
@@ -26397,279 +26294,6 @@
           </a:p>
         </p:txBody>
       </p:sp>
-      <p:sp>
-        <p:nvSpPr>
-          <p:cNvPr id="28" name="Rectangle 27">
-            <a:extLst>
-              <a:ext uri="{FF2B5EF4-FFF2-40B4-BE49-F238E27FC236}">
-                <a16:creationId xmlns:a16="http://schemas.microsoft.com/office/drawing/2014/main" id="{1CBA23FB-7453-12BD-4513-DA55521D9BEE}"/>
-              </a:ext>
-            </a:extLst>
-          </p:cNvPr>
-          <p:cNvSpPr/>
-          <p:nvPr/>
-        </p:nvSpPr>
-        <p:spPr>
-          <a:xfrm>
-            <a:off x="5098442" y="662890"/>
-            <a:ext cx="2127795" cy="1234935"/>
-          </a:xfrm>
-          <a:custGeom>
-            <a:avLst/>
-            <a:gdLst>
-              <a:gd name="connsiteX0" fmla="*/ 0 w 2127795"/>
-              <a:gd name="connsiteY0" fmla="*/ 0 h 1234935"/>
-              <a:gd name="connsiteX1" fmla="*/ 510671 w 2127795"/>
-              <a:gd name="connsiteY1" fmla="*/ 0 h 1234935"/>
-              <a:gd name="connsiteX2" fmla="*/ 1042620 w 2127795"/>
-              <a:gd name="connsiteY2" fmla="*/ 0 h 1234935"/>
-              <a:gd name="connsiteX3" fmla="*/ 1595846 w 2127795"/>
-              <a:gd name="connsiteY3" fmla="*/ 0 h 1234935"/>
-              <a:gd name="connsiteX4" fmla="*/ 2127795 w 2127795"/>
-              <a:gd name="connsiteY4" fmla="*/ 0 h 1234935"/>
-              <a:gd name="connsiteX5" fmla="*/ 2127795 w 2127795"/>
-              <a:gd name="connsiteY5" fmla="*/ 629817 h 1234935"/>
-              <a:gd name="connsiteX6" fmla="*/ 2127795 w 2127795"/>
-              <a:gd name="connsiteY6" fmla="*/ 1234935 h 1234935"/>
-              <a:gd name="connsiteX7" fmla="*/ 1553290 w 2127795"/>
-              <a:gd name="connsiteY7" fmla="*/ 1234935 h 1234935"/>
-              <a:gd name="connsiteX8" fmla="*/ 978786 w 2127795"/>
-              <a:gd name="connsiteY8" fmla="*/ 1234935 h 1234935"/>
-              <a:gd name="connsiteX9" fmla="*/ 0 w 2127795"/>
-              <a:gd name="connsiteY9" fmla="*/ 1234935 h 1234935"/>
-              <a:gd name="connsiteX10" fmla="*/ 0 w 2127795"/>
-              <a:gd name="connsiteY10" fmla="*/ 629817 h 1234935"/>
-              <a:gd name="connsiteX11" fmla="*/ 0 w 2127795"/>
-              <a:gd name="connsiteY11" fmla="*/ 0 h 1234935"/>
-            </a:gdLst>
-            <a:ahLst/>
-            <a:cxnLst>
-              <a:cxn ang="0">
-                <a:pos x="connsiteX0" y="connsiteY0"/>
-              </a:cxn>
-              <a:cxn ang="0">
-                <a:pos x="connsiteX1" y="connsiteY1"/>
-              </a:cxn>
-              <a:cxn ang="0">
-                <a:pos x="connsiteX2" y="connsiteY2"/>
-              </a:cxn>
-              <a:cxn ang="0">
-                <a:pos x="connsiteX3" y="connsiteY3"/>
-              </a:cxn>
-              <a:cxn ang="0">
-                <a:pos x="connsiteX4" y="connsiteY4"/>
-              </a:cxn>
-              <a:cxn ang="0">
-                <a:pos x="connsiteX5" y="connsiteY5"/>
-              </a:cxn>
-              <a:cxn ang="0">
-                <a:pos x="connsiteX6" y="connsiteY6"/>
-              </a:cxn>
-              <a:cxn ang="0">
-                <a:pos x="connsiteX7" y="connsiteY7"/>
-              </a:cxn>
-              <a:cxn ang="0">
-                <a:pos x="connsiteX8" y="connsiteY8"/>
-              </a:cxn>
-              <a:cxn ang="0">
-                <a:pos x="connsiteX9" y="connsiteY9"/>
-              </a:cxn>
-              <a:cxn ang="0">
-                <a:pos x="connsiteX10" y="connsiteY10"/>
-              </a:cxn>
-              <a:cxn ang="0">
-                <a:pos x="connsiteX11" y="connsiteY11"/>
-              </a:cxn>
-            </a:cxnLst>
-            <a:rect l="l" t="t" r="r" b="b"/>
-            <a:pathLst>
-              <a:path w="2127795" h="1234935" fill="none" extrusionOk="0">
-                <a:moveTo>
-                  <a:pt x="0" y="0"/>
-                </a:moveTo>
-                <a:cubicBezTo>
-                  <a:pt x="119302" y="-23815"/>
-                  <a:pt x="321953" y="-4268"/>
-                  <a:pt x="510671" y="0"/>
-                </a:cubicBezTo>
-                <a:cubicBezTo>
-                  <a:pt x="699389" y="4268"/>
-                  <a:pt x="838038" y="-4296"/>
-                  <a:pt x="1042620" y="0"/>
-                </a:cubicBezTo>
-                <a:cubicBezTo>
-                  <a:pt x="1247202" y="4296"/>
-                  <a:pt x="1418238" y="-20161"/>
-                  <a:pt x="1595846" y="0"/>
-                </a:cubicBezTo>
-                <a:cubicBezTo>
-                  <a:pt x="1773454" y="20161"/>
-                  <a:pt x="1930348" y="288"/>
-                  <a:pt x="2127795" y="0"/>
-                </a:cubicBezTo>
-                <a:cubicBezTo>
-                  <a:pt x="2157931" y="299914"/>
-                  <a:pt x="2132405" y="354606"/>
-                  <a:pt x="2127795" y="629817"/>
-                </a:cubicBezTo>
-                <a:cubicBezTo>
-                  <a:pt x="2123185" y="905028"/>
-                  <a:pt x="2121256" y="1110594"/>
-                  <a:pt x="2127795" y="1234935"/>
-                </a:cubicBezTo>
-                <a:cubicBezTo>
-                  <a:pt x="1890946" y="1251567"/>
-                  <a:pt x="1709293" y="1231838"/>
-                  <a:pt x="1553290" y="1234935"/>
-                </a:cubicBezTo>
-                <a:cubicBezTo>
-                  <a:pt x="1397287" y="1238032"/>
-                  <a:pt x="1242166" y="1239590"/>
-                  <a:pt x="978786" y="1234935"/>
-                </a:cubicBezTo>
-                <a:cubicBezTo>
-                  <a:pt x="715406" y="1230280"/>
-                  <a:pt x="281211" y="1234762"/>
-                  <a:pt x="0" y="1234935"/>
-                </a:cubicBezTo>
-                <a:cubicBezTo>
-                  <a:pt x="24760" y="1016687"/>
-                  <a:pt x="-16769" y="890304"/>
-                  <a:pt x="0" y="629817"/>
-                </a:cubicBezTo>
-                <a:cubicBezTo>
-                  <a:pt x="16769" y="369330"/>
-                  <a:pt x="14535" y="154799"/>
-                  <a:pt x="0" y="0"/>
-                </a:cubicBezTo>
-                <a:close/>
-              </a:path>
-              <a:path w="2127795" h="1234935" stroke="0" extrusionOk="0">
-                <a:moveTo>
-                  <a:pt x="0" y="0"/>
-                </a:moveTo>
-                <a:cubicBezTo>
-                  <a:pt x="171248" y="-8495"/>
-                  <a:pt x="325453" y="21877"/>
-                  <a:pt x="510671" y="0"/>
-                </a:cubicBezTo>
-                <a:cubicBezTo>
-                  <a:pt x="695889" y="-21877"/>
-                  <a:pt x="802356" y="-16277"/>
-                  <a:pt x="978786" y="0"/>
-                </a:cubicBezTo>
-                <a:cubicBezTo>
-                  <a:pt x="1155217" y="16277"/>
-                  <a:pt x="1321550" y="15209"/>
-                  <a:pt x="1553290" y="0"/>
-                </a:cubicBezTo>
-                <a:cubicBezTo>
-                  <a:pt x="1785030" y="-15209"/>
-                  <a:pt x="1999571" y="-24705"/>
-                  <a:pt x="2127795" y="0"/>
-                </a:cubicBezTo>
-                <a:cubicBezTo>
-                  <a:pt x="2115851" y="174757"/>
-                  <a:pt x="2100076" y="443170"/>
-                  <a:pt x="2127795" y="605118"/>
-                </a:cubicBezTo>
-                <a:cubicBezTo>
-                  <a:pt x="2155514" y="767066"/>
-                  <a:pt x="2134161" y="1036723"/>
-                  <a:pt x="2127795" y="1234935"/>
-                </a:cubicBezTo>
-                <a:cubicBezTo>
-                  <a:pt x="1970448" y="1216625"/>
-                  <a:pt x="1767058" y="1224671"/>
-                  <a:pt x="1595846" y="1234935"/>
-                </a:cubicBezTo>
-                <a:cubicBezTo>
-                  <a:pt x="1424634" y="1245199"/>
-                  <a:pt x="1144488" y="1230558"/>
-                  <a:pt x="1021342" y="1234935"/>
-                </a:cubicBezTo>
-                <a:cubicBezTo>
-                  <a:pt x="898196" y="1239312"/>
-                  <a:pt x="704334" y="1223412"/>
-                  <a:pt x="553227" y="1234935"/>
-                </a:cubicBezTo>
-                <a:cubicBezTo>
-                  <a:pt x="402121" y="1246458"/>
-                  <a:pt x="151220" y="1245336"/>
-                  <a:pt x="0" y="1234935"/>
-                </a:cubicBezTo>
-                <a:cubicBezTo>
-                  <a:pt x="13954" y="933914"/>
-                  <a:pt x="-64" y="841436"/>
-                  <a:pt x="0" y="617468"/>
-                </a:cubicBezTo>
-                <a:cubicBezTo>
-                  <a:pt x="64" y="393500"/>
-                  <a:pt x="4866" y="238355"/>
-                  <a:pt x="0" y="0"/>
-                </a:cubicBezTo>
-                <a:close/>
-              </a:path>
-            </a:pathLst>
-          </a:custGeom>
-          <a:solidFill>
-            <a:schemeClr val="accent4">
-              <a:lumMod val="60000"/>
-              <a:lumOff val="40000"/>
-            </a:schemeClr>
-          </a:solidFill>
-          <a:ln w="12700">
-            <a:solidFill>
-              <a:schemeClr val="tx1"/>
-            </a:solidFill>
-            <a:extLst>
-              <a:ext uri="{C807C97D-BFC1-408E-A445-0C87EB9F89A2}">
-                <ask:lineSketchStyleProps xmlns:ask="http://schemas.microsoft.com/office/drawing/2018/sketchyshapes" sd="1219033472">
-                  <a:prstGeom prst="rect">
-                    <a:avLst/>
-                  </a:prstGeom>
-                  <ask:type>
-                    <ask:lineSketchFreehand/>
-                  </ask:type>
-                </ask:lineSketchStyleProps>
-              </a:ext>
-            </a:extLst>
-          </a:ln>
-          <a:effectLst/>
-        </p:spPr>
-        <p:style>
-          <a:lnRef idx="1">
-            <a:schemeClr val="accent4"/>
-          </a:lnRef>
-          <a:fillRef idx="2">
-            <a:schemeClr val="accent4"/>
-          </a:fillRef>
-          <a:effectRef idx="1">
-            <a:schemeClr val="accent4"/>
-          </a:effectRef>
-          <a:fontRef idx="minor">
-            <a:schemeClr val="dk1"/>
-          </a:fontRef>
-        </p:style>
-        <p:txBody>
-          <a:bodyPr rtlCol="0" anchor="ctr"/>
-          <a:lstStyle/>
-          <a:p>
-            <a:pPr algn="ctr"/>
-            <a:r>
-              <a:rPr lang="en-US" sz="1600" dirty="0"/>
-              <a:t>Let’s jump ahead: </a:t>
-            </a:r>
-            <a:br>
-              <a:rPr lang="en-US" sz="1600" dirty="0"/>
-            </a:br>
-            <a:r>
-              <a:rPr lang="en-US" sz="1600" dirty="0"/>
-              <a:t>0,1,2,4,5,7,8,10 have been printed</a:t>
-            </a:r>
-          </a:p>
-        </p:txBody>
-      </p:sp>
       <p:cxnSp>
         <p:nvCxnSpPr>
           <p:cNvPr id="32" name="Curved Connector 31">
@@ -26736,20 +26360,6 @@
 <file path=ppt/slides/slide2.xml><?xml version="1.0" encoding="utf-8"?>
 <p:sld xmlns:a="http://schemas.openxmlformats.org/drawingml/2006/main" xmlns:r="http://schemas.openxmlformats.org/officeDocument/2006/relationships" xmlns:p="http://schemas.openxmlformats.org/presentationml/2006/main">
   <p:cSld>
-    <p:bg>
-      <p:bgPr>
-        <a:blipFill dpi="0" rotWithShape="1">
-          <a:blip r:embed="rId2">
-            <a:lum/>
-          </a:blip>
-          <a:srcRect/>
-          <a:stretch>
-            <a:fillRect/>
-          </a:stretch>
-        </a:blipFill>
-        <a:effectLst/>
-      </p:bgPr>
-    </p:bg>
     <p:spTree>
       <p:nvGrpSpPr>
         <p:cNvPr id="1" name=""/>
@@ -26824,7 +26434,7 @@
                     </a:schemeClr>
                   </a:solidFill>
                 </a:rPr>
-                <a:t>for(int </a:t>
+                <a:t>for (int </a:t>
               </a:r>
               <a:r>
                 <a:rPr lang="en-AU" sz="1600" dirty="0" err="1">
@@ -26913,14 +26523,6 @@
                 <a:t>    if (</a:t>
               </a:r>
               <a:r>
-                <a:rPr lang="en-AU" sz="1600" dirty="0">
-                  <a:solidFill>
-                    <a:srgbClr val="BA38EF"/>
-                  </a:solidFill>
-                </a:rPr>
-                <a:t> </a:t>
-              </a:r>
-              <a:r>
                 <a:rPr lang="en-AU" sz="1600" dirty="0" err="1">
                   <a:solidFill>
                     <a:srgbClr val="BA38EF"/>
@@ -26946,7 +26548,7 @@
               </a:r>
               <a:r>
                 <a:rPr lang="en-AU" sz="1600" dirty="0"/>
-                <a:t> % 3 == 0 )</a:t>
+                <a:t> % 3 == 0)</a:t>
               </a:r>
             </a:p>
             <a:p>
@@ -27086,7 +26688,7 @@
               <p:nvPr/>
             </p:nvPicPr>
             <p:blipFill>
-              <a:blip r:embed="rId3">
+              <a:blip r:embed="rId2">
                 <a:alphaModFix amt="30000"/>
               </a:blip>
               <a:stretch>
@@ -28871,7 +28473,7 @@
             <a:p>
               <a:r>
                 <a:rPr lang="en-US" dirty="0"/>
-                <a:t>4,6,7</a:t>
+                <a:t>7</a:t>
               </a:r>
             </a:p>
           </p:txBody>
@@ -28891,7 +28493,7 @@
             <p:nvPr/>
           </p:nvPicPr>
           <p:blipFill>
-            <a:blip r:embed="rId4">
+            <a:blip r:embed="rId3">
               <a:alphaModFix amt="30000"/>
             </a:blip>
             <a:stretch>
@@ -29465,20 +29067,6 @@
 <file path=ppt/slides/slide3.xml><?xml version="1.0" encoding="utf-8"?>
 <p:sld xmlns:a="http://schemas.openxmlformats.org/drawingml/2006/main" xmlns:r="http://schemas.openxmlformats.org/officeDocument/2006/relationships" xmlns:p="http://schemas.openxmlformats.org/presentationml/2006/main">
   <p:cSld>
-    <p:bg>
-      <p:bgPr>
-        <a:blipFill dpi="0" rotWithShape="1">
-          <a:blip r:embed="rId2">
-            <a:lum/>
-          </a:blip>
-          <a:srcRect/>
-          <a:stretch>
-            <a:fillRect/>
-          </a:stretch>
-        </a:blipFill>
-        <a:effectLst/>
-      </p:bgPr>
-    </p:bg>
     <p:spTree>
       <p:nvGrpSpPr>
         <p:cNvPr id="1" name=""/>
@@ -29553,7 +29141,7 @@
                     </a:schemeClr>
                   </a:solidFill>
                 </a:rPr>
-                <a:t>for(int </a:t>
+                <a:t>for (int </a:t>
               </a:r>
               <a:r>
                 <a:rPr lang="en-AU" sz="1600" dirty="0" err="1">
@@ -29645,7 +29233,7 @@
                     </a:schemeClr>
                   </a:solidFill>
                 </a:rPr>
-                <a:t>    if ( </a:t>
+                <a:t>    if (</a:t>
               </a:r>
               <a:r>
                 <a:rPr lang="en-AU" sz="1600" dirty="0" err="1">
@@ -29685,7 +29273,7 @@
                     </a:schemeClr>
                   </a:solidFill>
                 </a:rPr>
-                <a:t> % 3 == 0 )</a:t>
+                <a:t> % 3 == 0)</a:t>
               </a:r>
             </a:p>
             <a:p>
@@ -29807,7 +29395,7 @@
               <p:nvPr/>
             </p:nvPicPr>
             <p:blipFill>
-              <a:blip r:embed="rId3">
+              <a:blip r:embed="rId2">
                 <a:alphaModFix amt="30000"/>
               </a:blip>
               <a:stretch>
@@ -31603,7 +31191,7 @@
             <p:nvPr/>
           </p:nvPicPr>
           <p:blipFill>
-            <a:blip r:embed="rId4">
+            <a:blip r:embed="rId3">
               <a:alphaModFix/>
             </a:blip>
             <a:stretch>
@@ -32269,20 +31857,6 @@
 <file path=ppt/slides/slide4.xml><?xml version="1.0" encoding="utf-8"?>
 <p:sld xmlns:a="http://schemas.openxmlformats.org/drawingml/2006/main" xmlns:r="http://schemas.openxmlformats.org/officeDocument/2006/relationships" xmlns:p="http://schemas.openxmlformats.org/presentationml/2006/main">
   <p:cSld>
-    <p:bg>
-      <p:bgPr>
-        <a:blipFill dpi="0" rotWithShape="1">
-          <a:blip r:embed="rId2">
-            <a:lum/>
-          </a:blip>
-          <a:srcRect/>
-          <a:stretch>
-            <a:fillRect/>
-          </a:stretch>
-        </a:blipFill>
-        <a:effectLst/>
-      </p:bgPr>
-    </p:bg>
     <p:spTree>
       <p:nvGrpSpPr>
         <p:cNvPr id="1" name=""/>
@@ -32331,7 +31905,7 @@
           </p:nvSpPr>
           <p:spPr>
             <a:xfrm>
-              <a:off x="2236424" y="-2299353"/>
+              <a:off x="2264417" y="-2299353"/>
               <a:ext cx="5046276" cy="2062103"/>
             </a:xfrm>
             <a:prstGeom prst="rect">
@@ -32351,7 +31925,7 @@
               </a:pPr>
               <a:r>
                 <a:rPr lang="en-AU" sz="1600" dirty="0"/>
-                <a:t>for(</a:t>
+                <a:t>for (</a:t>
               </a:r>
               <a:r>
                 <a:rPr lang="en-AU" sz="1600" dirty="0">
@@ -32449,7 +32023,7 @@
                     </a:schemeClr>
                   </a:solidFill>
                 </a:rPr>
-                <a:t>    if ( </a:t>
+                <a:t>    if (</a:t>
               </a:r>
               <a:r>
                 <a:rPr lang="en-AU" sz="1600" dirty="0" err="1">
@@ -32489,7 +32063,7 @@
                     </a:schemeClr>
                   </a:solidFill>
                 </a:rPr>
-                <a:t> % 3 == 0 )</a:t>
+                <a:t> % 3 == 0)</a:t>
               </a:r>
             </a:p>
             <a:p>
@@ -32629,7 +32203,7 @@
               <p:nvPr/>
             </p:nvPicPr>
             <p:blipFill>
-              <a:blip r:embed="rId3">
+              <a:blip r:embed="rId2">
                 <a:alphaModFix amt="30000"/>
               </a:blip>
               <a:stretch>
@@ -34434,7 +34008,7 @@
             <p:nvPr/>
           </p:nvPicPr>
           <p:blipFill>
-            <a:blip r:embed="rId4">
+            <a:blip r:embed="rId3">
               <a:alphaModFix amt="30000"/>
             </a:blip>
             <a:stretch>
@@ -35112,20 +34686,6 @@
 <file path=ppt/slides/slide5.xml><?xml version="1.0" encoding="utf-8"?>
 <p:sld xmlns:a="http://schemas.openxmlformats.org/drawingml/2006/main" xmlns:r="http://schemas.openxmlformats.org/officeDocument/2006/relationships" xmlns:p="http://schemas.openxmlformats.org/presentationml/2006/main">
   <p:cSld>
-    <p:bg>
-      <p:bgPr>
-        <a:blipFill dpi="0" rotWithShape="1">
-          <a:blip r:embed="rId2">
-            <a:lum/>
-          </a:blip>
-          <a:srcRect/>
-          <a:stretch>
-            <a:fillRect/>
-          </a:stretch>
-        </a:blipFill>
-        <a:effectLst/>
-      </p:bgPr>
-    </p:bg>
     <p:spTree>
       <p:nvGrpSpPr>
         <p:cNvPr id="1" name=""/>
@@ -35200,7 +34760,7 @@
                     </a:schemeClr>
                   </a:solidFill>
                 </a:rPr>
-                <a:t>for(int </a:t>
+                <a:t>for (int </a:t>
               </a:r>
               <a:r>
                 <a:rPr lang="en-AU" sz="1600" dirty="0" err="1">
@@ -35286,7 +34846,7 @@
               </a:pPr>
               <a:r>
                 <a:rPr lang="en-AU" sz="1600" dirty="0"/>
-                <a:t>    if ( </a:t>
+                <a:t>    if (</a:t>
               </a:r>
               <a:r>
                 <a:rPr lang="en-AU" sz="1600" dirty="0" err="1"/>
@@ -35310,7 +34870,7 @@
                     <a:srgbClr val="BA38EF"/>
                   </a:solidFill>
                 </a:rPr>
-                <a:t> % 3 == 0 </a:t>
+                <a:t> % 3 == 0</a:t>
               </a:r>
               <a:r>
                 <a:rPr lang="en-AU" sz="1600" dirty="0"/>
@@ -35454,7 +35014,7 @@
               <p:nvPr/>
             </p:nvPicPr>
             <p:blipFill>
-              <a:blip r:embed="rId3">
+              <a:blip r:embed="rId2">
                 <a:alphaModFix amt="30000"/>
               </a:blip>
               <a:stretch>
@@ -37239,7 +36799,7 @@
             <a:p>
               <a:r>
                 <a:rPr lang="en-US" dirty="0"/>
-                <a:t>4,6,7</a:t>
+                <a:t>7</a:t>
               </a:r>
             </a:p>
           </p:txBody>
@@ -37259,7 +36819,7 @@
             <p:nvPr/>
           </p:nvPicPr>
           <p:blipFill>
-            <a:blip r:embed="rId4">
+            <a:blip r:embed="rId3">
               <a:alphaModFix amt="30000"/>
             </a:blip>
             <a:stretch>
@@ -38119,20 +37679,6 @@
 <file path=ppt/slides/slide6.xml><?xml version="1.0" encoding="utf-8"?>
 <p:sld xmlns:a="http://schemas.openxmlformats.org/drawingml/2006/main" xmlns:r="http://schemas.openxmlformats.org/officeDocument/2006/relationships" xmlns:p="http://schemas.openxmlformats.org/presentationml/2006/main">
   <p:cSld>
-    <p:bg>
-      <p:bgPr>
-        <a:blipFill dpi="0" rotWithShape="1">
-          <a:blip r:embed="rId2">
-            <a:lum/>
-          </a:blip>
-          <a:srcRect/>
-          <a:stretch>
-            <a:fillRect/>
-          </a:stretch>
-        </a:blipFill>
-        <a:effectLst/>
-      </p:bgPr>
-    </p:bg>
     <p:spTree>
       <p:nvGrpSpPr>
         <p:cNvPr id="1" name=""/>
@@ -38207,7 +37753,7 @@
                     </a:schemeClr>
                   </a:solidFill>
                 </a:rPr>
-                <a:t>for(int </a:t>
+                <a:t>for (int </a:t>
               </a:r>
               <a:r>
                 <a:rPr lang="en-AU" sz="1600" dirty="0" err="1">
@@ -38299,7 +37845,7 @@
                     </a:schemeClr>
                   </a:solidFill>
                 </a:rPr>
-                <a:t>    if ( </a:t>
+                <a:t>    if (</a:t>
               </a:r>
               <a:r>
                 <a:rPr lang="en-AU" sz="1600" dirty="0" err="1">
@@ -38339,7 +37885,7 @@
                     </a:schemeClr>
                   </a:solidFill>
                 </a:rPr>
-                <a:t> % 3 == 0 )</a:t>
+                <a:t> % 3 == 0)</a:t>
               </a:r>
             </a:p>
             <a:p>
@@ -38461,7 +38007,7 @@
               <p:nvPr/>
             </p:nvPicPr>
             <p:blipFill>
-              <a:blip r:embed="rId3">
+              <a:blip r:embed="rId2">
                 <a:alphaModFix amt="30000"/>
               </a:blip>
               <a:stretch>
@@ -40257,7 +39803,7 @@
             <p:nvPr/>
           </p:nvPicPr>
           <p:blipFill>
-            <a:blip r:embed="rId4">
+            <a:blip r:embed="rId3">
               <a:alphaModFix/>
             </a:blip>
             <a:stretch>
@@ -40986,20 +40532,6 @@
 <file path=ppt/slides/slide7.xml><?xml version="1.0" encoding="utf-8"?>
 <p:sld xmlns:a="http://schemas.openxmlformats.org/drawingml/2006/main" xmlns:r="http://schemas.openxmlformats.org/officeDocument/2006/relationships" xmlns:p="http://schemas.openxmlformats.org/presentationml/2006/main">
   <p:cSld>
-    <p:bg>
-      <p:bgPr>
-        <a:blipFill dpi="0" rotWithShape="1">
-          <a:blip r:embed="rId2">
-            <a:lum/>
-          </a:blip>
-          <a:srcRect/>
-          <a:stretch>
-            <a:fillRect/>
-          </a:stretch>
-        </a:blipFill>
-        <a:effectLst/>
-      </p:bgPr>
-    </p:bg>
     <p:spTree>
       <p:nvGrpSpPr>
         <p:cNvPr id="1" name=""/>
@@ -41048,7 +40580,7 @@
           </p:nvSpPr>
           <p:spPr>
             <a:xfrm>
-              <a:off x="2236424" y="-2299353"/>
+              <a:off x="2264417" y="-2299353"/>
               <a:ext cx="5046276" cy="2062103"/>
             </a:xfrm>
             <a:prstGeom prst="rect">
@@ -41068,7 +40600,7 @@
               </a:pPr>
               <a:r>
                 <a:rPr lang="en-AU" sz="1600" dirty="0"/>
-                <a:t>for(</a:t>
+                <a:t>for (</a:t>
               </a:r>
               <a:r>
                 <a:rPr lang="en-AU" sz="1600" dirty="0">
@@ -41166,7 +40698,7 @@
                     </a:schemeClr>
                   </a:solidFill>
                 </a:rPr>
-                <a:t>    if ( </a:t>
+                <a:t>    if (</a:t>
               </a:r>
               <a:r>
                 <a:rPr lang="en-AU" sz="1600" dirty="0" err="1">
@@ -41206,7 +40738,7 @@
                     </a:schemeClr>
                   </a:solidFill>
                 </a:rPr>
-                <a:t> % 3 == 0 )</a:t>
+                <a:t> % 3 == 0)</a:t>
               </a:r>
             </a:p>
             <a:p>
@@ -41346,7 +40878,7 @@
               <p:nvPr/>
             </p:nvPicPr>
             <p:blipFill>
-              <a:blip r:embed="rId3">
+              <a:blip r:embed="rId2">
                 <a:alphaModFix amt="30000"/>
               </a:blip>
               <a:stretch>
@@ -43151,7 +42683,7 @@
             <p:nvPr/>
           </p:nvPicPr>
           <p:blipFill>
-            <a:blip r:embed="rId4">
+            <a:blip r:embed="rId3">
               <a:alphaModFix amt="30000"/>
             </a:blip>
             <a:stretch>
@@ -43882,20 +43414,6 @@
 <file path=ppt/slides/slide8.xml><?xml version="1.0" encoding="utf-8"?>
 <p:sld xmlns:a="http://schemas.openxmlformats.org/drawingml/2006/main" xmlns:r="http://schemas.openxmlformats.org/officeDocument/2006/relationships" xmlns:p="http://schemas.openxmlformats.org/presentationml/2006/main">
   <p:cSld>
-    <p:bg>
-      <p:bgPr>
-        <a:blipFill dpi="0" rotWithShape="1">
-          <a:blip r:embed="rId2">
-            <a:lum/>
-          </a:blip>
-          <a:srcRect/>
-          <a:stretch>
-            <a:fillRect/>
-          </a:stretch>
-        </a:blipFill>
-        <a:effectLst/>
-      </p:bgPr>
-    </p:bg>
     <p:spTree>
       <p:nvGrpSpPr>
         <p:cNvPr id="1" name=""/>
@@ -43970,7 +43488,7 @@
                     </a:schemeClr>
                   </a:solidFill>
                 </a:rPr>
-                <a:t>for(int </a:t>
+                <a:t>for (int </a:t>
               </a:r>
               <a:r>
                 <a:rPr lang="en-AU" sz="1600" dirty="0" err="1">
@@ -44056,7 +43574,7 @@
               </a:pPr>
               <a:r>
                 <a:rPr lang="en-AU" sz="1600" dirty="0"/>
-                <a:t>    if ( </a:t>
+                <a:t>    if (</a:t>
               </a:r>
               <a:r>
                 <a:rPr lang="en-AU" sz="1600" dirty="0" err="1"/>
@@ -44080,7 +43598,7 @@
                     <a:srgbClr val="BA38EF"/>
                   </a:solidFill>
                 </a:rPr>
-                <a:t> % 3 == 0 </a:t>
+                <a:t> % 3 == 0</a:t>
               </a:r>
               <a:r>
                 <a:rPr lang="en-AU" sz="1600" dirty="0"/>
@@ -44224,7 +43742,7 @@
               <p:nvPr/>
             </p:nvPicPr>
             <p:blipFill>
-              <a:blip r:embed="rId3">
+              <a:blip r:embed="rId2">
                 <a:alphaModFix amt="30000"/>
               </a:blip>
               <a:stretch>
@@ -46009,7 +45527,7 @@
             <a:p>
               <a:r>
                 <a:rPr lang="en-US" dirty="0"/>
-                <a:t>4,6,7</a:t>
+                <a:t>7</a:t>
               </a:r>
             </a:p>
           </p:txBody>
@@ -46029,7 +45547,7 @@
             <p:nvPr/>
           </p:nvPicPr>
           <p:blipFill>
-            <a:blip r:embed="rId4">
+            <a:blip r:embed="rId3">
               <a:alphaModFix amt="30000"/>
             </a:blip>
             <a:stretch>
@@ -46901,20 +46419,6 @@
 <file path=ppt/slides/slide9.xml><?xml version="1.0" encoding="utf-8"?>
 <p:sld xmlns:a="http://schemas.openxmlformats.org/drawingml/2006/main" xmlns:r="http://schemas.openxmlformats.org/officeDocument/2006/relationships" xmlns:p="http://schemas.openxmlformats.org/presentationml/2006/main">
   <p:cSld>
-    <p:bg>
-      <p:bgPr>
-        <a:blipFill dpi="0" rotWithShape="1">
-          <a:blip r:embed="rId2">
-            <a:lum/>
-          </a:blip>
-          <a:srcRect/>
-          <a:stretch>
-            <a:fillRect/>
-          </a:stretch>
-        </a:blipFill>
-        <a:effectLst/>
-      </p:bgPr>
-    </p:bg>
     <p:spTree>
       <p:nvGrpSpPr>
         <p:cNvPr id="1" name=""/>
@@ -46989,7 +46493,7 @@
                     </a:schemeClr>
                   </a:solidFill>
                 </a:rPr>
-                <a:t>for(int </a:t>
+                <a:t>for (int </a:t>
               </a:r>
               <a:r>
                 <a:rPr lang="en-AU" sz="1600" dirty="0" err="1">
@@ -47081,7 +46585,7 @@
                     </a:schemeClr>
                   </a:solidFill>
                 </a:rPr>
-                <a:t>    if ( </a:t>
+                <a:t>    if (</a:t>
               </a:r>
               <a:r>
                 <a:rPr lang="en-AU" sz="1600" dirty="0" err="1">
@@ -47121,7 +46625,7 @@
                     </a:schemeClr>
                   </a:solidFill>
                 </a:rPr>
-                <a:t> % 3 == 0 )</a:t>
+                <a:t> % 3 == 0)</a:t>
               </a:r>
             </a:p>
             <a:p>
@@ -47243,7 +46747,7 @@
               <p:nvPr/>
             </p:nvPicPr>
             <p:blipFill>
-              <a:blip r:embed="rId3">
+              <a:blip r:embed="rId2">
                 <a:alphaModFix amt="30000"/>
               </a:blip>
               <a:stretch>
@@ -49039,7 +48543,7 @@
             <p:nvPr/>
           </p:nvPicPr>
           <p:blipFill>
-            <a:blip r:embed="rId4">
+            <a:blip r:embed="rId3">
               <a:alphaModFix/>
             </a:blip>
             <a:stretch>

</xml_diff>